<commit_message>
2018 fall - first half
</commit_message>
<xml_diff>
--- a/dm1/minitalks/ron/knowing_ds/know_ds_rn.pptx
+++ b/dm1/minitalks/ron/knowing_ds/know_ds_rn.pptx
@@ -5,7 +5,7 @@
     <p:sldMasterId id="2147483648" r:id="rId1"/>
   </p:sldMasterIdLst>
   <p:notesMasterIdLst>
-    <p:notesMasterId r:id="rId19"/>
+    <p:notesMasterId r:id="rId21"/>
   </p:notesMasterIdLst>
   <p:sldIdLst>
     <p:sldId id="256" r:id="rId2"/>
@@ -19,12 +19,14 @@
     <p:sldId id="266" r:id="rId10"/>
     <p:sldId id="259" r:id="rId11"/>
     <p:sldId id="270" r:id="rId12"/>
-    <p:sldId id="267" r:id="rId13"/>
-    <p:sldId id="264" r:id="rId14"/>
-    <p:sldId id="265" r:id="rId15"/>
-    <p:sldId id="258" r:id="rId16"/>
-    <p:sldId id="274" r:id="rId17"/>
-    <p:sldId id="275" r:id="rId18"/>
+    <p:sldId id="278" r:id="rId13"/>
+    <p:sldId id="279" r:id="rId14"/>
+    <p:sldId id="267" r:id="rId15"/>
+    <p:sldId id="264" r:id="rId16"/>
+    <p:sldId id="265" r:id="rId17"/>
+    <p:sldId id="258" r:id="rId18"/>
+    <p:sldId id="274" r:id="rId19"/>
+    <p:sldId id="275" r:id="rId20"/>
   </p:sldIdLst>
   <p:sldSz cx="12192000" cy="6858000"/>
   <p:notesSz cx="6858000" cy="9144000"/>
@@ -4439,7 +4441,7 @@
           <a:p>
             <a:fld id="{3FF724DD-C013-4DED-9F53-18D16E116C32}" type="datetimeFigureOut">
               <a:rPr lang="en-US" smtClean="0"/>
-              <a:t>8/3/2018</a:t>
+              <a:t>10/18/2018</a:t>
             </a:fld>
             <a:endParaRPr lang="en-US"/>
           </a:p>
@@ -4751,7 +4753,7 @@
           <a:bodyPr/>
           <a:lstStyle/>
           <a:p>
-            <a:endParaRPr lang="en-US" dirty="0"/>
+            <a:endParaRPr lang="en-US"/>
           </a:p>
         </p:txBody>
       </p:sp>
@@ -4772,7 +4774,7 @@
           <a:p>
             <a:fld id="{37D0CA89-0B36-463A-B501-CC109FC43DD6}" type="slidenum">
               <a:rPr lang="en-US" smtClean="0"/>
-              <a:t>3</a:t>
+              <a:t>1</a:t>
             </a:fld>
             <a:endParaRPr lang="en-US"/>
           </a:p>
@@ -4781,7 +4783,7 @@
     </p:spTree>
     <p:extLst>
       <p:ext uri="{BB962C8B-B14F-4D97-AF65-F5344CB8AC3E}">
-        <p14:creationId xmlns:p14="http://schemas.microsoft.com/office/powerpoint/2010/main" val="3310527456"/>
+        <p14:creationId xmlns:p14="http://schemas.microsoft.com/office/powerpoint/2010/main" val="592698388"/>
       </p:ext>
     </p:extLst>
   </p:cSld>
@@ -4835,6 +4837,22 @@
           <a:bodyPr/>
           <a:lstStyle/>
           <a:p>
+            <a:r>
+              <a:rPr lang="en-US" dirty="0" smtClean="0"/>
+              <a:t>While advice</a:t>
+            </a:r>
+            <a:r>
+              <a:rPr lang="en-US" baseline="0" dirty="0" smtClean="0"/>
+              <a:t> is the goal what proportion of effort constitutes it as a deliverable?  </a:t>
+            </a:r>
+            <a:r>
+              <a:rPr lang="en-US" dirty="0" smtClean="0"/>
+              <a:t>How much space does advise take</a:t>
+            </a:r>
+            <a:r>
+              <a:rPr lang="en-US" baseline="0" dirty="0" smtClean="0"/>
+              <a:t> up on the graph?</a:t>
+            </a:r>
             <a:endParaRPr lang="en-US" dirty="0"/>
           </a:p>
         </p:txBody>
@@ -4856,7 +4874,7 @@
           <a:p>
             <a:fld id="{37D0CA89-0B36-463A-B501-CC109FC43DD6}" type="slidenum">
               <a:rPr lang="en-US" smtClean="0"/>
-              <a:t>15</a:t>
+              <a:t>12</a:t>
             </a:fld>
             <a:endParaRPr lang="en-US"/>
           </a:p>
@@ -4865,7 +4883,7 @@
     </p:spTree>
     <p:extLst>
       <p:ext uri="{BB962C8B-B14F-4D97-AF65-F5344CB8AC3E}">
-        <p14:creationId xmlns:p14="http://schemas.microsoft.com/office/powerpoint/2010/main" val="3276505696"/>
+        <p14:creationId xmlns:p14="http://schemas.microsoft.com/office/powerpoint/2010/main" val="2525356824"/>
       </p:ext>
     </p:extLst>
   </p:cSld>
@@ -4921,6 +4939,274 @@
           <a:p>
             <a:r>
               <a:rPr lang="en-US" dirty="0" smtClean="0"/>
+              <a:t>While advice</a:t>
+            </a:r>
+            <a:r>
+              <a:rPr lang="en-US" baseline="0" dirty="0" smtClean="0"/>
+              <a:t> is the goal what proportion of effort constitutes it as a deliverable?  </a:t>
+            </a:r>
+            <a:r>
+              <a:rPr lang="en-US" dirty="0" smtClean="0"/>
+              <a:t>How much space does advise take</a:t>
+            </a:r>
+            <a:r>
+              <a:rPr lang="en-US" baseline="0" dirty="0" smtClean="0"/>
+              <a:t> up on the graph?</a:t>
+            </a:r>
+            <a:endParaRPr lang="en-US" dirty="0"/>
+          </a:p>
+        </p:txBody>
+      </p:sp>
+      <p:sp>
+        <p:nvSpPr>
+          <p:cNvPr id="4" name="Slide Number Placeholder 3"/>
+          <p:cNvSpPr>
+            <a:spLocks noGrp="1"/>
+          </p:cNvSpPr>
+          <p:nvPr>
+            <p:ph type="sldNum" sz="quarter" idx="10"/>
+          </p:nvPr>
+        </p:nvSpPr>
+        <p:spPr/>
+        <p:txBody>
+          <a:bodyPr/>
+          <a:lstStyle/>
+          <a:p>
+            <a:fld id="{37D0CA89-0B36-463A-B501-CC109FC43DD6}" type="slidenum">
+              <a:rPr lang="en-US" smtClean="0"/>
+              <a:t>13</a:t>
+            </a:fld>
+            <a:endParaRPr lang="en-US"/>
+          </a:p>
+        </p:txBody>
+      </p:sp>
+    </p:spTree>
+    <p:extLst>
+      <p:ext uri="{BB962C8B-B14F-4D97-AF65-F5344CB8AC3E}">
+        <p14:creationId xmlns:p14="http://schemas.microsoft.com/office/powerpoint/2010/main" val="2409045430"/>
+      </p:ext>
+    </p:extLst>
+  </p:cSld>
+  <p:clrMapOvr>
+    <a:masterClrMapping/>
+  </p:clrMapOvr>
+</p:notes>
+</file>
+
+<file path=ppt/notesSlides/notesSlide12.xml><?xml version="1.0" encoding="utf-8"?>
+<p:notes xmlns:a="http://schemas.openxmlformats.org/drawingml/2006/main" xmlns:r="http://schemas.openxmlformats.org/officeDocument/2006/relationships" xmlns:p="http://schemas.openxmlformats.org/presentationml/2006/main">
+  <p:cSld>
+    <p:spTree>
+      <p:nvGrpSpPr>
+        <p:cNvPr id="1" name=""/>
+        <p:cNvGrpSpPr/>
+        <p:nvPr/>
+      </p:nvGrpSpPr>
+      <p:grpSpPr>
+        <a:xfrm>
+          <a:off x="0" y="0"/>
+          <a:ext cx="0" cy="0"/>
+          <a:chOff x="0" y="0"/>
+          <a:chExt cx="0" cy="0"/>
+        </a:xfrm>
+      </p:grpSpPr>
+      <p:sp>
+        <p:nvSpPr>
+          <p:cNvPr id="2" name="Slide Image Placeholder 1"/>
+          <p:cNvSpPr>
+            <a:spLocks noGrp="1" noRot="1" noChangeAspect="1"/>
+          </p:cNvSpPr>
+          <p:nvPr>
+            <p:ph type="sldImg"/>
+          </p:nvPr>
+        </p:nvSpPr>
+        <p:spPr/>
+      </p:sp>
+      <p:sp>
+        <p:nvSpPr>
+          <p:cNvPr id="3" name="Notes Placeholder 2"/>
+          <p:cNvSpPr>
+            <a:spLocks noGrp="1"/>
+          </p:cNvSpPr>
+          <p:nvPr>
+            <p:ph type="body" idx="1"/>
+          </p:nvPr>
+        </p:nvSpPr>
+        <p:spPr/>
+        <p:txBody>
+          <a:bodyPr/>
+          <a:lstStyle/>
+          <a:p>
+            <a:endParaRPr lang="en-US" dirty="0"/>
+          </a:p>
+        </p:txBody>
+      </p:sp>
+      <p:sp>
+        <p:nvSpPr>
+          <p:cNvPr id="4" name="Slide Number Placeholder 3"/>
+          <p:cNvSpPr>
+            <a:spLocks noGrp="1"/>
+          </p:cNvSpPr>
+          <p:nvPr>
+            <p:ph type="sldNum" sz="quarter" idx="10"/>
+          </p:nvPr>
+        </p:nvSpPr>
+        <p:spPr/>
+        <p:txBody>
+          <a:bodyPr/>
+          <a:lstStyle/>
+          <a:p>
+            <a:fld id="{37D0CA89-0B36-463A-B501-CC109FC43DD6}" type="slidenum">
+              <a:rPr lang="en-US" smtClean="0"/>
+              <a:t>15</a:t>
+            </a:fld>
+            <a:endParaRPr lang="en-US"/>
+          </a:p>
+        </p:txBody>
+      </p:sp>
+    </p:spTree>
+    <p:extLst>
+      <p:ext uri="{BB962C8B-B14F-4D97-AF65-F5344CB8AC3E}">
+        <p14:creationId xmlns:p14="http://schemas.microsoft.com/office/powerpoint/2010/main" val="137883517"/>
+      </p:ext>
+    </p:extLst>
+  </p:cSld>
+  <p:clrMapOvr>
+    <a:masterClrMapping/>
+  </p:clrMapOvr>
+</p:notes>
+</file>
+
+<file path=ppt/notesSlides/notesSlide13.xml><?xml version="1.0" encoding="utf-8"?>
+<p:notes xmlns:a="http://schemas.openxmlformats.org/drawingml/2006/main" xmlns:r="http://schemas.openxmlformats.org/officeDocument/2006/relationships" xmlns:p="http://schemas.openxmlformats.org/presentationml/2006/main">
+  <p:cSld>
+    <p:spTree>
+      <p:nvGrpSpPr>
+        <p:cNvPr id="1" name=""/>
+        <p:cNvGrpSpPr/>
+        <p:nvPr/>
+      </p:nvGrpSpPr>
+      <p:grpSpPr>
+        <a:xfrm>
+          <a:off x="0" y="0"/>
+          <a:ext cx="0" cy="0"/>
+          <a:chOff x="0" y="0"/>
+          <a:chExt cx="0" cy="0"/>
+        </a:xfrm>
+      </p:grpSpPr>
+      <p:sp>
+        <p:nvSpPr>
+          <p:cNvPr id="2" name="Slide Image Placeholder 1"/>
+          <p:cNvSpPr>
+            <a:spLocks noGrp="1" noRot="1" noChangeAspect="1"/>
+          </p:cNvSpPr>
+          <p:nvPr>
+            <p:ph type="sldImg"/>
+          </p:nvPr>
+        </p:nvSpPr>
+        <p:spPr/>
+      </p:sp>
+      <p:sp>
+        <p:nvSpPr>
+          <p:cNvPr id="3" name="Notes Placeholder 2"/>
+          <p:cNvSpPr>
+            <a:spLocks noGrp="1"/>
+          </p:cNvSpPr>
+          <p:nvPr>
+            <p:ph type="body" idx="1"/>
+          </p:nvPr>
+        </p:nvSpPr>
+        <p:spPr/>
+        <p:txBody>
+          <a:bodyPr/>
+          <a:lstStyle/>
+          <a:p>
+            <a:endParaRPr lang="en-US" dirty="0"/>
+          </a:p>
+        </p:txBody>
+      </p:sp>
+      <p:sp>
+        <p:nvSpPr>
+          <p:cNvPr id="4" name="Slide Number Placeholder 3"/>
+          <p:cNvSpPr>
+            <a:spLocks noGrp="1"/>
+          </p:cNvSpPr>
+          <p:nvPr>
+            <p:ph type="sldNum" sz="quarter" idx="10"/>
+          </p:nvPr>
+        </p:nvSpPr>
+        <p:spPr/>
+        <p:txBody>
+          <a:bodyPr/>
+          <a:lstStyle/>
+          <a:p>
+            <a:fld id="{37D0CA89-0B36-463A-B501-CC109FC43DD6}" type="slidenum">
+              <a:rPr lang="en-US" smtClean="0"/>
+              <a:t>17</a:t>
+            </a:fld>
+            <a:endParaRPr lang="en-US"/>
+          </a:p>
+        </p:txBody>
+      </p:sp>
+    </p:spTree>
+    <p:extLst>
+      <p:ext uri="{BB962C8B-B14F-4D97-AF65-F5344CB8AC3E}">
+        <p14:creationId xmlns:p14="http://schemas.microsoft.com/office/powerpoint/2010/main" val="3276505696"/>
+      </p:ext>
+    </p:extLst>
+  </p:cSld>
+  <p:clrMapOvr>
+    <a:masterClrMapping/>
+  </p:clrMapOvr>
+</p:notes>
+</file>
+
+<file path=ppt/notesSlides/notesSlide14.xml><?xml version="1.0" encoding="utf-8"?>
+<p:notes xmlns:a="http://schemas.openxmlformats.org/drawingml/2006/main" xmlns:r="http://schemas.openxmlformats.org/officeDocument/2006/relationships" xmlns:p="http://schemas.openxmlformats.org/presentationml/2006/main">
+  <p:cSld>
+    <p:spTree>
+      <p:nvGrpSpPr>
+        <p:cNvPr id="1" name=""/>
+        <p:cNvGrpSpPr/>
+        <p:nvPr/>
+      </p:nvGrpSpPr>
+      <p:grpSpPr>
+        <a:xfrm>
+          <a:off x="0" y="0"/>
+          <a:ext cx="0" cy="0"/>
+          <a:chOff x="0" y="0"/>
+          <a:chExt cx="0" cy="0"/>
+        </a:xfrm>
+      </p:grpSpPr>
+      <p:sp>
+        <p:nvSpPr>
+          <p:cNvPr id="2" name="Slide Image Placeholder 1"/>
+          <p:cNvSpPr>
+            <a:spLocks noGrp="1" noRot="1" noChangeAspect="1"/>
+          </p:cNvSpPr>
+          <p:nvPr>
+            <p:ph type="sldImg"/>
+          </p:nvPr>
+        </p:nvSpPr>
+        <p:spPr/>
+      </p:sp>
+      <p:sp>
+        <p:nvSpPr>
+          <p:cNvPr id="3" name="Notes Placeholder 2"/>
+          <p:cNvSpPr>
+            <a:spLocks noGrp="1"/>
+          </p:cNvSpPr>
+          <p:nvPr>
+            <p:ph type="body" idx="1"/>
+          </p:nvPr>
+        </p:nvSpPr>
+        <p:spPr/>
+        <p:txBody>
+          <a:bodyPr/>
+          <a:lstStyle/>
+          <a:p>
+            <a:r>
+              <a:rPr lang="en-US" dirty="0" smtClean="0"/>
               <a:t>Clockwise: be,</a:t>
             </a:r>
             <a:r>
@@ -4948,7 +5234,7 @@
           <a:p>
             <a:fld id="{37D0CA89-0B36-463A-B501-CC109FC43DD6}" type="slidenum">
               <a:rPr lang="en-US" smtClean="0"/>
-              <a:t>16</a:t>
+              <a:t>18</a:t>
             </a:fld>
             <a:endParaRPr lang="en-US"/>
           </a:p>
@@ -5032,7 +5318,7 @@
           <a:p>
             <a:fld id="{37D0CA89-0B36-463A-B501-CC109FC43DD6}" type="slidenum">
               <a:rPr lang="en-US" smtClean="0"/>
-              <a:t>5</a:t>
+              <a:t>3</a:t>
             </a:fld>
             <a:endParaRPr lang="en-US"/>
           </a:p>
@@ -5041,7 +5327,7 @@
     </p:spTree>
     <p:extLst>
       <p:ext uri="{BB962C8B-B14F-4D97-AF65-F5344CB8AC3E}">
-        <p14:creationId xmlns:p14="http://schemas.microsoft.com/office/powerpoint/2010/main" val="1615835921"/>
+        <p14:creationId xmlns:p14="http://schemas.microsoft.com/office/powerpoint/2010/main" val="3310527456"/>
       </p:ext>
     </p:extLst>
   </p:cSld>
@@ -5116,7 +5402,7 @@
           <a:p>
             <a:fld id="{37D0CA89-0B36-463A-B501-CC109FC43DD6}" type="slidenum">
               <a:rPr lang="en-US" smtClean="0"/>
-              <a:t>6</a:t>
+              <a:t>5</a:t>
             </a:fld>
             <a:endParaRPr lang="en-US"/>
           </a:p>
@@ -5125,7 +5411,7 @@
     </p:spTree>
     <p:extLst>
       <p:ext uri="{BB962C8B-B14F-4D97-AF65-F5344CB8AC3E}">
-        <p14:creationId xmlns:p14="http://schemas.microsoft.com/office/powerpoint/2010/main" val="2496575018"/>
+        <p14:creationId xmlns:p14="http://schemas.microsoft.com/office/powerpoint/2010/main" val="1615835921"/>
       </p:ext>
     </p:extLst>
   </p:cSld>
@@ -5179,20 +5465,6 @@
           <a:bodyPr/>
           <a:lstStyle/>
           <a:p>
-            <a:r>
-              <a:rPr lang="en-US" dirty="0" smtClean="0"/>
-              <a:t>Banquet and collapsed temple.  Who was there?</a:t>
-            </a:r>
-          </a:p>
-          <a:p>
-            <a:r>
-              <a:rPr lang="en-US" dirty="0" smtClean="0"/>
-              <a:t>Treasure map, end point, start point, and basis with</a:t>
-            </a:r>
-            <a:r>
-              <a:rPr lang="en-US" baseline="0" dirty="0" smtClean="0"/>
-              <a:t> origin (North, South, East, West)</a:t>
-            </a:r>
             <a:endParaRPr lang="en-US" dirty="0"/>
           </a:p>
         </p:txBody>
@@ -5214,7 +5486,7 @@
           <a:p>
             <a:fld id="{37D0CA89-0B36-463A-B501-CC109FC43DD6}" type="slidenum">
               <a:rPr lang="en-US" smtClean="0"/>
-              <a:t>7</a:t>
+              <a:t>6</a:t>
             </a:fld>
             <a:endParaRPr lang="en-US"/>
           </a:p>
@@ -5223,7 +5495,7 @@
     </p:spTree>
     <p:extLst>
       <p:ext uri="{BB962C8B-B14F-4D97-AF65-F5344CB8AC3E}">
-        <p14:creationId xmlns:p14="http://schemas.microsoft.com/office/powerpoint/2010/main" val="4246526326"/>
+        <p14:creationId xmlns:p14="http://schemas.microsoft.com/office/powerpoint/2010/main" val="2496575018"/>
       </p:ext>
     </p:extLst>
   </p:cSld>
@@ -5278,8 +5550,18 @@
           <a:lstStyle/>
           <a:p>
             <a:r>
+              <a:rPr lang="en-US" dirty="0" smtClean="0"/>
+              <a:t>Banquet and collapsed temple.  Who was there?</a:t>
+            </a:r>
+          </a:p>
+          <a:p>
+            <a:r>
+              <a:rPr lang="en-US" dirty="0" smtClean="0"/>
+              <a:t>Treasure map, end point, start point, and basis with</a:t>
+            </a:r>
+            <a:r>
               <a:rPr lang="en-US" baseline="0" dirty="0" smtClean="0"/>
-              <a:t>Start point:</a:t>
+              <a:t> origin (North, South, East, West)</a:t>
             </a:r>
             <a:endParaRPr lang="en-US" dirty="0"/>
           </a:p>
@@ -5302,7 +5584,7 @@
           <a:p>
             <a:fld id="{37D0CA89-0B36-463A-B501-CC109FC43DD6}" type="slidenum">
               <a:rPr lang="en-US" smtClean="0"/>
-              <a:t>8</a:t>
+              <a:t>7</a:t>
             </a:fld>
             <a:endParaRPr lang="en-US"/>
           </a:p>
@@ -5311,7 +5593,7 @@
     </p:spTree>
     <p:extLst>
       <p:ext uri="{BB962C8B-B14F-4D97-AF65-F5344CB8AC3E}">
-        <p14:creationId xmlns:p14="http://schemas.microsoft.com/office/powerpoint/2010/main" val="3136048214"/>
+        <p14:creationId xmlns:p14="http://schemas.microsoft.com/office/powerpoint/2010/main" val="4246526326"/>
       </p:ext>
     </p:extLst>
   </p:cSld>
@@ -5367,19 +5649,7 @@
           <a:p>
             <a:r>
               <a:rPr lang="en-US" baseline="0" dirty="0" smtClean="0"/>
-              <a:t>Supervised: train from known outcomes</a:t>
-            </a:r>
-          </a:p>
-          <a:p>
-            <a:r>
-              <a:rPr lang="en-US" baseline="0" dirty="0" smtClean="0"/>
-              <a:t>Unsupervised: learn and discover relationships in data</a:t>
-            </a:r>
-          </a:p>
-          <a:p>
-            <a:r>
-              <a:rPr lang="en-US" baseline="0" dirty="0" smtClean="0"/>
-              <a:t>Loosely defined: can assign numbers to categories, can assign known labels to clusters</a:t>
+              <a:t>Start point:</a:t>
             </a:r>
             <a:endParaRPr lang="en-US" dirty="0"/>
           </a:p>
@@ -5402,7 +5672,7 @@
           <a:p>
             <a:fld id="{37D0CA89-0B36-463A-B501-CC109FC43DD6}" type="slidenum">
               <a:rPr lang="en-US" smtClean="0"/>
-              <a:t>9</a:t>
+              <a:t>8</a:t>
             </a:fld>
             <a:endParaRPr lang="en-US"/>
           </a:p>
@@ -5411,7 +5681,7 @@
     </p:spTree>
     <p:extLst>
       <p:ext uri="{BB962C8B-B14F-4D97-AF65-F5344CB8AC3E}">
-        <p14:creationId xmlns:p14="http://schemas.microsoft.com/office/powerpoint/2010/main" val="3758985942"/>
+        <p14:creationId xmlns:p14="http://schemas.microsoft.com/office/powerpoint/2010/main" val="3136048214"/>
       </p:ext>
     </p:extLst>
   </p:cSld>
@@ -5466,12 +5736,20 @@
           <a:lstStyle/>
           <a:p>
             <a:r>
-              <a:rPr lang="en-US" dirty="0" smtClean="0"/>
-              <a:t>What</a:t>
-            </a:r>
-            <a:r>
               <a:rPr lang="en-US" baseline="0" dirty="0" smtClean="0"/>
-              <a:t> are the origin and basis vectors?</a:t>
+              <a:t>Supervised: train from known outcomes</a:t>
+            </a:r>
+          </a:p>
+          <a:p>
+            <a:r>
+              <a:rPr lang="en-US" baseline="0" dirty="0" smtClean="0"/>
+              <a:t>Unsupervised: learn and discover relationships in data</a:t>
+            </a:r>
+          </a:p>
+          <a:p>
+            <a:r>
+              <a:rPr lang="en-US" baseline="0" dirty="0" smtClean="0"/>
+              <a:t>Loosely defined: can assign numbers to categories, can assign known labels to clusters</a:t>
             </a:r>
             <a:endParaRPr lang="en-US" dirty="0"/>
           </a:p>
@@ -5494,7 +5772,7 @@
           <a:p>
             <a:fld id="{37D0CA89-0B36-463A-B501-CC109FC43DD6}" type="slidenum">
               <a:rPr lang="en-US" smtClean="0"/>
-              <a:t>10</a:t>
+              <a:t>9</a:t>
             </a:fld>
             <a:endParaRPr lang="en-US"/>
           </a:p>
@@ -5503,7 +5781,7 @@
     </p:spTree>
     <p:extLst>
       <p:ext uri="{BB962C8B-B14F-4D97-AF65-F5344CB8AC3E}">
-        <p14:creationId xmlns:p14="http://schemas.microsoft.com/office/powerpoint/2010/main" val="4228789661"/>
+        <p14:creationId xmlns:p14="http://schemas.microsoft.com/office/powerpoint/2010/main" val="3758985942"/>
       </p:ext>
     </p:extLst>
   </p:cSld>
@@ -5559,19 +5837,11 @@
           <a:p>
             <a:r>
               <a:rPr lang="en-US" dirty="0" smtClean="0"/>
-              <a:t>While advice</a:t>
+              <a:t>What</a:t>
             </a:r>
             <a:r>
               <a:rPr lang="en-US" baseline="0" dirty="0" smtClean="0"/>
-              <a:t> is the goal what proportion of effort constitutes it as a deliverable?  </a:t>
-            </a:r>
-            <a:r>
-              <a:rPr lang="en-US" dirty="0" smtClean="0"/>
-              <a:t>How much space does advise take</a:t>
-            </a:r>
-            <a:r>
-              <a:rPr lang="en-US" baseline="0" dirty="0" smtClean="0"/>
-              <a:t> up on the graph?</a:t>
+              <a:t> are the origin and basis vectors?</a:t>
             </a:r>
             <a:endParaRPr lang="en-US" dirty="0"/>
           </a:p>
@@ -5594,7 +5864,7 @@
           <a:p>
             <a:fld id="{37D0CA89-0B36-463A-B501-CC109FC43DD6}" type="slidenum">
               <a:rPr lang="en-US" smtClean="0"/>
-              <a:t>11</a:t>
+              <a:t>10</a:t>
             </a:fld>
             <a:endParaRPr lang="en-US"/>
           </a:p>
@@ -5603,7 +5873,7 @@
     </p:spTree>
     <p:extLst>
       <p:ext uri="{BB962C8B-B14F-4D97-AF65-F5344CB8AC3E}">
-        <p14:creationId xmlns:p14="http://schemas.microsoft.com/office/powerpoint/2010/main" val="3910516011"/>
+        <p14:creationId xmlns:p14="http://schemas.microsoft.com/office/powerpoint/2010/main" val="4228789661"/>
       </p:ext>
     </p:extLst>
   </p:cSld>
@@ -5657,6 +5927,22 @@
           <a:bodyPr/>
           <a:lstStyle/>
           <a:p>
+            <a:r>
+              <a:rPr lang="en-US" dirty="0" smtClean="0"/>
+              <a:t>While advice</a:t>
+            </a:r>
+            <a:r>
+              <a:rPr lang="en-US" baseline="0" dirty="0" smtClean="0"/>
+              <a:t> is the goal what proportion of effort constitutes it as a deliverable?  </a:t>
+            </a:r>
+            <a:r>
+              <a:rPr lang="en-US" dirty="0" smtClean="0"/>
+              <a:t>How much space does advise take</a:t>
+            </a:r>
+            <a:r>
+              <a:rPr lang="en-US" baseline="0" dirty="0" smtClean="0"/>
+              <a:t> up on the graph?</a:t>
+            </a:r>
             <a:endParaRPr lang="en-US" dirty="0"/>
           </a:p>
         </p:txBody>
@@ -5678,7 +5964,7 @@
           <a:p>
             <a:fld id="{37D0CA89-0B36-463A-B501-CC109FC43DD6}" type="slidenum">
               <a:rPr lang="en-US" smtClean="0"/>
-              <a:t>13</a:t>
+              <a:t>11</a:t>
             </a:fld>
             <a:endParaRPr lang="en-US"/>
           </a:p>
@@ -5687,7 +5973,7 @@
     </p:spTree>
     <p:extLst>
       <p:ext uri="{BB962C8B-B14F-4D97-AF65-F5344CB8AC3E}">
-        <p14:creationId xmlns:p14="http://schemas.microsoft.com/office/powerpoint/2010/main" val="137883517"/>
+        <p14:creationId xmlns:p14="http://schemas.microsoft.com/office/powerpoint/2010/main" val="3910516011"/>
       </p:ext>
     </p:extLst>
   </p:cSld>
@@ -5828,7 +6114,7 @@
           <a:p>
             <a:fld id="{B9231216-36D3-43A5-A9F7-6E5DCCF6D363}" type="datetimeFigureOut">
               <a:rPr lang="en-US" smtClean="0"/>
-              <a:t>8/3/2018</a:t>
+              <a:t>10/18/2018</a:t>
             </a:fld>
             <a:endParaRPr lang="en-US"/>
           </a:p>
@@ -5998,7 +6284,7 @@
           <a:p>
             <a:fld id="{B9231216-36D3-43A5-A9F7-6E5DCCF6D363}" type="datetimeFigureOut">
               <a:rPr lang="en-US" smtClean="0"/>
-              <a:t>8/3/2018</a:t>
+              <a:t>10/18/2018</a:t>
             </a:fld>
             <a:endParaRPr lang="en-US"/>
           </a:p>
@@ -6178,7 +6464,7 @@
           <a:p>
             <a:fld id="{B9231216-36D3-43A5-A9F7-6E5DCCF6D363}" type="datetimeFigureOut">
               <a:rPr lang="en-US" smtClean="0"/>
-              <a:t>8/3/2018</a:t>
+              <a:t>10/18/2018</a:t>
             </a:fld>
             <a:endParaRPr lang="en-US"/>
           </a:p>
@@ -6348,7 +6634,7 @@
           <a:p>
             <a:fld id="{B9231216-36D3-43A5-A9F7-6E5DCCF6D363}" type="datetimeFigureOut">
               <a:rPr lang="en-US" smtClean="0"/>
-              <a:t>8/3/2018</a:t>
+              <a:t>10/18/2018</a:t>
             </a:fld>
             <a:endParaRPr lang="en-US"/>
           </a:p>
@@ -6594,7 +6880,7 @@
           <a:p>
             <a:fld id="{B9231216-36D3-43A5-A9F7-6E5DCCF6D363}" type="datetimeFigureOut">
               <a:rPr lang="en-US" smtClean="0"/>
-              <a:t>8/3/2018</a:t>
+              <a:t>10/18/2018</a:t>
             </a:fld>
             <a:endParaRPr lang="en-US"/>
           </a:p>
@@ -6826,7 +7112,7 @@
           <a:p>
             <a:fld id="{B9231216-36D3-43A5-A9F7-6E5DCCF6D363}" type="datetimeFigureOut">
               <a:rPr lang="en-US" smtClean="0"/>
-              <a:t>8/3/2018</a:t>
+              <a:t>10/18/2018</a:t>
             </a:fld>
             <a:endParaRPr lang="en-US"/>
           </a:p>
@@ -7193,7 +7479,7 @@
           <a:p>
             <a:fld id="{B9231216-36D3-43A5-A9F7-6E5DCCF6D363}" type="datetimeFigureOut">
               <a:rPr lang="en-US" smtClean="0"/>
-              <a:t>8/3/2018</a:t>
+              <a:t>10/18/2018</a:t>
             </a:fld>
             <a:endParaRPr lang="en-US"/>
           </a:p>
@@ -7311,7 +7597,7 @@
           <a:p>
             <a:fld id="{B9231216-36D3-43A5-A9F7-6E5DCCF6D363}" type="datetimeFigureOut">
               <a:rPr lang="en-US" smtClean="0"/>
-              <a:t>8/3/2018</a:t>
+              <a:t>10/18/2018</a:t>
             </a:fld>
             <a:endParaRPr lang="en-US"/>
           </a:p>
@@ -7406,7 +7692,7 @@
           <a:p>
             <a:fld id="{B9231216-36D3-43A5-A9F7-6E5DCCF6D363}" type="datetimeFigureOut">
               <a:rPr lang="en-US" smtClean="0"/>
-              <a:t>8/3/2018</a:t>
+              <a:t>10/18/2018</a:t>
             </a:fld>
             <a:endParaRPr lang="en-US"/>
           </a:p>
@@ -7683,7 +7969,7 @@
           <a:p>
             <a:fld id="{B9231216-36D3-43A5-A9F7-6E5DCCF6D363}" type="datetimeFigureOut">
               <a:rPr lang="en-US" smtClean="0"/>
-              <a:t>8/3/2018</a:t>
+              <a:t>10/18/2018</a:t>
             </a:fld>
             <a:endParaRPr lang="en-US"/>
           </a:p>
@@ -7936,7 +8222,7 @@
           <a:p>
             <a:fld id="{B9231216-36D3-43A5-A9F7-6E5DCCF6D363}" type="datetimeFigureOut">
               <a:rPr lang="en-US" smtClean="0"/>
-              <a:t>8/3/2018</a:t>
+              <a:t>10/18/2018</a:t>
             </a:fld>
             <a:endParaRPr lang="en-US"/>
           </a:p>
@@ -8149,7 +8435,7 @@
           <a:p>
             <a:fld id="{B9231216-36D3-43A5-A9F7-6E5DCCF6D363}" type="datetimeFigureOut">
               <a:rPr lang="en-US" smtClean="0"/>
-              <a:t>8/3/2018</a:t>
+              <a:t>10/18/2018</a:t>
             </a:fld>
             <a:endParaRPr lang="en-US"/>
           </a:p>
@@ -8621,7 +8907,7 @@
           <a:p>
             <a:r>
               <a:rPr lang="en-US" dirty="0" smtClean="0"/>
-              <a:t>2018.Aug.1</a:t>
+              <a:t>2018.Oct.18</a:t>
             </a:r>
           </a:p>
           <a:p>
@@ -8630,7 +8916,7 @@
           <a:p>
             <a:r>
               <a:rPr lang="en-US" dirty="0" smtClean="0">
-                <a:hlinkClick r:id="rId2"/>
+                <a:hlinkClick r:id="rId3"/>
               </a:rPr>
               <a:t>https://github.com/SpeedCoder5/notes</a:t>
             </a:r>
@@ -8988,7 +9274,15 @@
             </a:pPr>
             <a:r>
               <a:rPr lang="en-US" dirty="0" smtClean="0"/>
-              <a:t>Goal: Advice</a:t>
+              <a:t>Goal: </a:t>
+            </a:r>
+            <a:r>
+              <a:rPr lang="en-US" dirty="0" smtClean="0">
+                <a:solidFill>
+                  <a:srgbClr val="00B050"/>
+                </a:solidFill>
+              </a:rPr>
+              <a:t>Advice</a:t>
             </a:r>
           </a:p>
         </p:txBody>
@@ -9023,6 +9317,52 @@
           </a:prstGeom>
         </p:spPr>
       </p:pic>
+      <p:sp>
+        <p:nvSpPr>
+          <p:cNvPr id="4" name="Oval 3"/>
+          <p:cNvSpPr/>
+          <p:nvPr/>
+        </p:nvSpPr>
+        <p:spPr>
+          <a:xfrm>
+            <a:off x="10210800" y="1334395"/>
+            <a:ext cx="1552575" cy="1075429"/>
+          </a:xfrm>
+          <a:prstGeom prst="ellipse">
+            <a:avLst/>
+          </a:prstGeom>
+          <a:noFill/>
+          <a:ln w="28575">
+            <a:solidFill>
+              <a:srgbClr val="00B050"/>
+            </a:solidFill>
+          </a:ln>
+        </p:spPr>
+        <p:style>
+          <a:lnRef idx="2">
+            <a:schemeClr val="accent1">
+              <a:shade val="50000"/>
+            </a:schemeClr>
+          </a:lnRef>
+          <a:fillRef idx="1">
+            <a:schemeClr val="accent1"/>
+          </a:fillRef>
+          <a:effectRef idx="0">
+            <a:schemeClr val="accent1"/>
+          </a:effectRef>
+          <a:fontRef idx="minor">
+            <a:schemeClr val="lt1"/>
+          </a:fontRef>
+        </p:style>
+        <p:txBody>
+          <a:bodyPr rtlCol="0" anchor="ctr"/>
+          <a:lstStyle/>
+          <a:p>
+            <a:pPr algn="ctr"/>
+            <a:endParaRPr lang="en-US"/>
+          </a:p>
+        </p:txBody>
+      </p:sp>
     </p:spTree>
     <p:extLst>
       <p:ext uri="{BB962C8B-B14F-4D97-AF65-F5344CB8AC3E}">
@@ -9070,43 +9410,10 @@
             <p:ph type="title"/>
           </p:nvPr>
         </p:nvSpPr>
-        <p:spPr/>
-        <p:txBody>
-          <a:bodyPr>
-            <a:normAutofit fontScale="90000"/>
-          </a:bodyPr>
-          <a:lstStyle/>
-          <a:p>
-            <a:pPr lvl="0"/>
-            <a:r>
-              <a:rPr lang="en-US" dirty="0" smtClean="0"/>
-              <a:t>BAH Field Guide: </a:t>
-            </a:r>
-            <a:br>
-              <a:rPr lang="en-US" dirty="0" smtClean="0"/>
-            </a:br>
-            <a:r>
-              <a:rPr lang="en-US" b="1" dirty="0" smtClean="0"/>
-              <a:t>Data Science is the art of turning data into actions:</a:t>
-            </a:r>
-            <a:endParaRPr lang="en-US" b="1" dirty="0"/>
-          </a:p>
-        </p:txBody>
-      </p:sp>
-      <p:sp>
-        <p:nvSpPr>
-          <p:cNvPr id="3" name="Content Placeholder 2"/>
-          <p:cNvSpPr>
-            <a:spLocks noGrp="1"/>
-          </p:cNvSpPr>
-          <p:nvPr>
-            <p:ph idx="1"/>
-          </p:nvPr>
-        </p:nvSpPr>
         <p:spPr>
           <a:xfrm>
-            <a:off x="838200" y="1825625"/>
-            <a:ext cx="10515600" cy="4832350"/>
+            <a:off x="0" y="0"/>
+            <a:ext cx="12321153" cy="852407"/>
           </a:xfrm>
         </p:spPr>
         <p:txBody>
@@ -9117,130 +9424,255 @@
           <a:p>
             <a:pPr lvl="0"/>
             <a:r>
-              <a:rPr lang="en-US" sz="3200" dirty="0" smtClean="0"/>
-              <a:t>Tradecraft </a:t>
-            </a:r>
-            <a:r>
-              <a:rPr lang="en-US" sz="3200" i="1" dirty="0" smtClean="0"/>
-              <a:t>creates </a:t>
-            </a:r>
-            <a:r>
-              <a:rPr lang="en-US" sz="3200" b="1" i="1" dirty="0" smtClean="0"/>
-              <a:t>data products</a:t>
-            </a:r>
-            <a:endParaRPr lang="en-US" sz="3200" b="1" dirty="0" smtClean="0"/>
+              <a:rPr lang="en-US" sz="3900" dirty="0"/>
+              <a:t>Booz Allen Hamilton's (BAH's) </a:t>
+            </a:r>
+            <a:r>
+              <a:rPr lang="en-US" sz="3900" dirty="0">
+                <a:hlinkClick r:id="rId3"/>
+              </a:rPr>
+              <a:t>Field Guide to Data </a:t>
+            </a:r>
+            <a:r>
+              <a:rPr lang="en-US" sz="3900" dirty="0" smtClean="0">
+                <a:hlinkClick r:id="rId3"/>
+              </a:rPr>
+              <a:t>Science</a:t>
+            </a:r>
+            <a:endParaRPr lang="en-US" sz="3900" dirty="0"/>
+          </a:p>
+        </p:txBody>
+      </p:sp>
+      <p:pic>
+        <p:nvPicPr>
+          <p:cNvPr id="5" name="Picture 4"/>
+          <p:cNvPicPr>
+            <a:picLocks noChangeAspect="1"/>
+          </p:cNvPicPr>
+          <p:nvPr/>
+        </p:nvPicPr>
+        <p:blipFill>
+          <a:blip r:embed="rId4">
+            <a:extLst>
+              <a:ext uri="{28A0092B-C50C-407E-A947-70E740481C1C}">
+                <a14:useLocalDpi xmlns:a14="http://schemas.microsoft.com/office/drawing/2010/main" val="0"/>
+              </a:ext>
+            </a:extLst>
+          </a:blip>
+          <a:stretch>
+            <a:fillRect/>
+          </a:stretch>
+        </p:blipFill>
+        <p:spPr>
+          <a:xfrm>
+            <a:off x="2910130" y="657876"/>
+            <a:ext cx="9089502" cy="6171718"/>
+          </a:xfrm>
+          <a:prstGeom prst="rect">
+            <a:avLst/>
+          </a:prstGeom>
+        </p:spPr>
+      </p:pic>
+      <p:sp>
+        <p:nvSpPr>
+          <p:cNvPr id="3" name="Content Placeholder 2"/>
+          <p:cNvSpPr>
+            <a:spLocks noGrp="1"/>
+          </p:cNvSpPr>
+          <p:nvPr>
+            <p:ph idx="1"/>
+          </p:nvPr>
+        </p:nvSpPr>
+        <p:spPr>
+          <a:xfrm>
+            <a:off x="152400" y="1181100"/>
+            <a:ext cx="2867025" cy="2505075"/>
+          </a:xfrm>
+        </p:spPr>
+        <p:txBody>
+          <a:bodyPr>
+            <a:normAutofit fontScale="92500" lnSpcReduction="20000"/>
+          </a:bodyPr>
+          <a:lstStyle/>
+          <a:p>
+            <a:pPr marL="0" lvl="0" indent="0">
+              <a:buNone/>
+            </a:pPr>
+            <a:r>
+              <a:rPr lang="en-US" dirty="0" smtClean="0"/>
+              <a:t>Where are you?</a:t>
+            </a:r>
+          </a:p>
+          <a:p>
+            <a:pPr lvl="0"/>
+            <a:r>
+              <a:rPr lang="en-US" dirty="0" smtClean="0"/>
+              <a:t>Individual</a:t>
+            </a:r>
+          </a:p>
+          <a:p>
+            <a:pPr lvl="0"/>
+            <a:r>
+              <a:rPr lang="en-US" dirty="0" smtClean="0"/>
+              <a:t>Organization</a:t>
+            </a:r>
+          </a:p>
+          <a:p>
+            <a:pPr lvl="0"/>
+            <a:r>
+              <a:rPr lang="en-US" dirty="0" smtClean="0"/>
+              <a:t>Per Project</a:t>
+            </a:r>
           </a:p>
           <a:p>
             <a:pPr lvl="1"/>
-            <a:r>
-              <a:rPr lang="en-US" sz="3200" dirty="0" smtClean="0"/>
-              <a:t>Drive </a:t>
-            </a:r>
-            <a:r>
-              <a:rPr lang="en-US" sz="3200" dirty="0"/>
-              <a:t>actions </a:t>
-            </a:r>
-            <a:r>
-              <a:rPr lang="en-US" sz="3200" dirty="0" smtClean="0"/>
-              <a:t>– </a:t>
-            </a:r>
-            <a:r>
-              <a:rPr lang="en-US" sz="3200" b="1" i="1" dirty="0" smtClean="0"/>
-              <a:t>advice</a:t>
-            </a:r>
-            <a:r>
-              <a:rPr lang="en-US" sz="3200" dirty="0" smtClean="0"/>
-              <a:t> – possibility and danger</a:t>
-            </a:r>
-          </a:p>
-          <a:p>
-            <a:pPr lvl="0"/>
-            <a:r>
-              <a:rPr lang="en-US" sz="3200" dirty="0" smtClean="0"/>
-              <a:t>Supports and encourages shifting between:</a:t>
-            </a:r>
-          </a:p>
-          <a:p>
-            <a:pPr lvl="1"/>
-            <a:r>
-              <a:rPr lang="en-US" sz="3200" b="1" dirty="0" smtClean="0"/>
-              <a:t>Deductive</a:t>
-            </a:r>
-            <a:r>
-              <a:rPr lang="en-US" sz="3200" dirty="0" smtClean="0"/>
-              <a:t> (hypothesis-based) reasoning</a:t>
-            </a:r>
-          </a:p>
-          <a:p>
-            <a:pPr lvl="1"/>
-            <a:r>
-              <a:rPr lang="en-US" sz="3200" b="1" dirty="0" smtClean="0"/>
-              <a:t>Inductive</a:t>
-            </a:r>
-            <a:r>
-              <a:rPr lang="en-US" sz="3200" dirty="0" smtClean="0"/>
-              <a:t> (pattern-based) reasoning</a:t>
-            </a:r>
-          </a:p>
-          <a:p>
-            <a:pPr lvl="0"/>
-            <a:r>
-              <a:rPr lang="en-US" sz="3200" dirty="0"/>
-              <a:t>N</a:t>
-            </a:r>
-            <a:r>
-              <a:rPr lang="en-US" sz="3200" dirty="0" smtClean="0"/>
-              <a:t>ecessary for companies to </a:t>
-            </a:r>
-            <a:r>
-              <a:rPr lang="en-US" sz="3200" b="1" dirty="0" smtClean="0"/>
-              <a:t>compete</a:t>
-            </a:r>
-          </a:p>
-          <a:p>
-            <a:pPr lvl="0"/>
-            <a:r>
-              <a:rPr lang="en-US" sz="3200" dirty="0" smtClean="0"/>
-              <a:t>Capabilities </a:t>
-            </a:r>
-            <a:r>
-              <a:rPr lang="en-US" sz="3200" b="1" dirty="0" smtClean="0"/>
-              <a:t>can be built</a:t>
-            </a:r>
-            <a:r>
-              <a:rPr lang="en-US" sz="3200" dirty="0" smtClean="0"/>
-              <a:t> over time</a:t>
-            </a:r>
-          </a:p>
-          <a:p>
-            <a:pPr lvl="0"/>
-            <a:r>
-              <a:rPr lang="en-US" sz="3200" dirty="0" smtClean="0"/>
-              <a:t>Different kind of team sport</a:t>
-            </a:r>
-          </a:p>
-          <a:p>
-            <a:pPr lvl="1"/>
-            <a:r>
-              <a:rPr lang="en-US" sz="2800" dirty="0" smtClean="0"/>
-              <a:t>Company-wide </a:t>
-            </a:r>
-            <a:r>
-              <a:rPr lang="en-US" sz="2800" i="1" dirty="0" smtClean="0"/>
-              <a:t>open culture </a:t>
-            </a:r>
-            <a:r>
-              <a:rPr lang="en-US" sz="2800" dirty="0" smtClean="0"/>
-              <a:t>– commitment to insights from data</a:t>
-            </a:r>
-            <a:endParaRPr lang="en-US" sz="2800" dirty="0"/>
+            <a:endParaRPr lang="en-US" dirty="0" smtClean="0"/>
+          </a:p>
+          <a:p>
+            <a:pPr marL="0" indent="0">
+              <a:buNone/>
+            </a:pPr>
+            <a:r>
+              <a:rPr lang="en-US" dirty="0" smtClean="0"/>
+              <a:t>Goal: </a:t>
+            </a:r>
+            <a:r>
+              <a:rPr lang="en-US" dirty="0" smtClean="0">
+                <a:solidFill>
+                  <a:srgbClr val="00B050"/>
+                </a:solidFill>
+              </a:rPr>
+              <a:t>Advice</a:t>
+            </a:r>
+          </a:p>
+        </p:txBody>
+      </p:sp>
+      <p:pic>
+        <p:nvPicPr>
+          <p:cNvPr id="6" name="Picture 5"/>
+          <p:cNvPicPr>
+            <a:picLocks noChangeAspect="1"/>
+          </p:cNvPicPr>
+          <p:nvPr/>
+        </p:nvPicPr>
+        <p:blipFill>
+          <a:blip r:embed="rId5">
+            <a:extLst>
+              <a:ext uri="{28A0092B-C50C-407E-A947-70E740481C1C}">
+                <a14:useLocalDpi xmlns:a14="http://schemas.microsoft.com/office/drawing/2010/main" val="0"/>
+              </a:ext>
+            </a:extLst>
+          </a:blip>
+          <a:stretch>
+            <a:fillRect/>
+          </a:stretch>
+        </p:blipFill>
+        <p:spPr>
+          <a:xfrm>
+            <a:off x="83274" y="3686175"/>
+            <a:ext cx="2743583" cy="2743583"/>
+          </a:xfrm>
+          <a:prstGeom prst="rect">
+            <a:avLst/>
+          </a:prstGeom>
+        </p:spPr>
+      </p:pic>
+      <p:sp>
+        <p:nvSpPr>
+          <p:cNvPr id="4" name="Oval 3"/>
+          <p:cNvSpPr/>
+          <p:nvPr/>
+        </p:nvSpPr>
+        <p:spPr>
+          <a:xfrm>
+            <a:off x="10210800" y="1334395"/>
+            <a:ext cx="1552575" cy="1075429"/>
+          </a:xfrm>
+          <a:prstGeom prst="ellipse">
+            <a:avLst/>
+          </a:prstGeom>
+          <a:noFill/>
+          <a:ln w="28575">
+            <a:solidFill>
+              <a:srgbClr val="00B050"/>
+            </a:solidFill>
+          </a:ln>
+        </p:spPr>
+        <p:style>
+          <a:lnRef idx="2">
+            <a:schemeClr val="accent1">
+              <a:shade val="50000"/>
+            </a:schemeClr>
+          </a:lnRef>
+          <a:fillRef idx="1">
+            <a:schemeClr val="accent1"/>
+          </a:fillRef>
+          <a:effectRef idx="0">
+            <a:schemeClr val="accent1"/>
+          </a:effectRef>
+          <a:fontRef idx="minor">
+            <a:schemeClr val="lt1"/>
+          </a:fontRef>
+        </p:style>
+        <p:txBody>
+          <a:bodyPr rtlCol="0" anchor="ctr"/>
+          <a:lstStyle/>
+          <a:p>
+            <a:pPr algn="ctr"/>
+            <a:endParaRPr lang="en-US"/>
+          </a:p>
+        </p:txBody>
+      </p:sp>
+      <p:sp>
+        <p:nvSpPr>
+          <p:cNvPr id="7" name="Oval 6"/>
+          <p:cNvSpPr/>
+          <p:nvPr/>
+        </p:nvSpPr>
+        <p:spPr>
+          <a:xfrm>
+            <a:off x="4277360" y="1334394"/>
+            <a:ext cx="873760" cy="5095363"/>
+          </a:xfrm>
+          <a:prstGeom prst="ellipse">
+            <a:avLst/>
+          </a:prstGeom>
+          <a:noFill/>
+          <a:ln w="28575">
+            <a:solidFill>
+              <a:srgbClr val="00B050"/>
+            </a:solidFill>
+          </a:ln>
+        </p:spPr>
+        <p:style>
+          <a:lnRef idx="2">
+            <a:schemeClr val="accent1">
+              <a:shade val="50000"/>
+            </a:schemeClr>
+          </a:lnRef>
+          <a:fillRef idx="1">
+            <a:schemeClr val="accent1"/>
+          </a:fillRef>
+          <a:effectRef idx="0">
+            <a:schemeClr val="accent1"/>
+          </a:effectRef>
+          <a:fontRef idx="minor">
+            <a:schemeClr val="lt1"/>
+          </a:fontRef>
+        </p:style>
+        <p:txBody>
+          <a:bodyPr rtlCol="0" anchor="ctr"/>
+          <a:lstStyle/>
+          <a:p>
+            <a:pPr algn="ctr"/>
+            <a:endParaRPr lang="en-US"/>
           </a:p>
         </p:txBody>
       </p:sp>
     </p:spTree>
     <p:extLst>
       <p:ext uri="{BB962C8B-B14F-4D97-AF65-F5344CB8AC3E}">
-        <p14:creationId xmlns:p14="http://schemas.microsoft.com/office/powerpoint/2010/main" val="1356862054"/>
+        <p14:creationId xmlns:p14="http://schemas.microsoft.com/office/powerpoint/2010/main" val="1306573025"/>
       </p:ext>
     </p:extLst>
   </p:cSld>
@@ -9286,6 +9718,716 @@
         </p:nvSpPr>
         <p:spPr>
           <a:xfrm>
+            <a:off x="0" y="0"/>
+            <a:ext cx="12321153" cy="852407"/>
+          </a:xfrm>
+        </p:spPr>
+        <p:txBody>
+          <a:bodyPr>
+            <a:normAutofit/>
+          </a:bodyPr>
+          <a:lstStyle/>
+          <a:p>
+            <a:pPr lvl="0"/>
+            <a:r>
+              <a:rPr lang="en-US" sz="3900" dirty="0"/>
+              <a:t>Booz Allen Hamilton's (BAH's) </a:t>
+            </a:r>
+            <a:r>
+              <a:rPr lang="en-US" sz="3900" dirty="0">
+                <a:hlinkClick r:id="rId3"/>
+              </a:rPr>
+              <a:t>Field Guide to Data </a:t>
+            </a:r>
+            <a:r>
+              <a:rPr lang="en-US" sz="3900" dirty="0" smtClean="0">
+                <a:hlinkClick r:id="rId3"/>
+              </a:rPr>
+              <a:t>Science</a:t>
+            </a:r>
+            <a:endParaRPr lang="en-US" sz="3900" dirty="0"/>
+          </a:p>
+        </p:txBody>
+      </p:sp>
+      <p:pic>
+        <p:nvPicPr>
+          <p:cNvPr id="5" name="Picture 4"/>
+          <p:cNvPicPr>
+            <a:picLocks noChangeAspect="1"/>
+          </p:cNvPicPr>
+          <p:nvPr/>
+        </p:nvPicPr>
+        <p:blipFill>
+          <a:blip r:embed="rId4">
+            <a:extLst>
+              <a:ext uri="{28A0092B-C50C-407E-A947-70E740481C1C}">
+                <a14:useLocalDpi xmlns:a14="http://schemas.microsoft.com/office/drawing/2010/main" val="0"/>
+              </a:ext>
+            </a:extLst>
+          </a:blip>
+          <a:stretch>
+            <a:fillRect/>
+          </a:stretch>
+        </p:blipFill>
+        <p:spPr>
+          <a:xfrm>
+            <a:off x="2910130" y="686282"/>
+            <a:ext cx="9089502" cy="6171718"/>
+          </a:xfrm>
+          <a:prstGeom prst="rect">
+            <a:avLst/>
+          </a:prstGeom>
+        </p:spPr>
+      </p:pic>
+      <p:sp>
+        <p:nvSpPr>
+          <p:cNvPr id="3" name="Content Placeholder 2"/>
+          <p:cNvSpPr>
+            <a:spLocks noGrp="1"/>
+          </p:cNvSpPr>
+          <p:nvPr>
+            <p:ph idx="1"/>
+          </p:nvPr>
+        </p:nvSpPr>
+        <p:spPr>
+          <a:xfrm>
+            <a:off x="152400" y="1181100"/>
+            <a:ext cx="2867025" cy="2505075"/>
+          </a:xfrm>
+        </p:spPr>
+        <p:txBody>
+          <a:bodyPr>
+            <a:normAutofit fontScale="92500" lnSpcReduction="20000"/>
+          </a:bodyPr>
+          <a:lstStyle/>
+          <a:p>
+            <a:pPr marL="0" lvl="0" indent="0">
+              <a:buNone/>
+            </a:pPr>
+            <a:r>
+              <a:rPr lang="en-US" dirty="0" smtClean="0"/>
+              <a:t>Where are you?</a:t>
+            </a:r>
+          </a:p>
+          <a:p>
+            <a:pPr lvl="0"/>
+            <a:r>
+              <a:rPr lang="en-US" dirty="0" smtClean="0"/>
+              <a:t>Individual</a:t>
+            </a:r>
+          </a:p>
+          <a:p>
+            <a:pPr lvl="0"/>
+            <a:r>
+              <a:rPr lang="en-US" dirty="0" smtClean="0"/>
+              <a:t>Organization</a:t>
+            </a:r>
+          </a:p>
+          <a:p>
+            <a:pPr lvl="0"/>
+            <a:r>
+              <a:rPr lang="en-US" dirty="0" smtClean="0"/>
+              <a:t>Per Project</a:t>
+            </a:r>
+          </a:p>
+          <a:p>
+            <a:pPr lvl="1"/>
+            <a:endParaRPr lang="en-US" dirty="0" smtClean="0"/>
+          </a:p>
+          <a:p>
+            <a:pPr marL="0" indent="0">
+              <a:buNone/>
+            </a:pPr>
+            <a:r>
+              <a:rPr lang="en-US" dirty="0" smtClean="0"/>
+              <a:t>Goal: </a:t>
+            </a:r>
+            <a:r>
+              <a:rPr lang="en-US" dirty="0" smtClean="0">
+                <a:solidFill>
+                  <a:srgbClr val="00B050"/>
+                </a:solidFill>
+              </a:rPr>
+              <a:t>Advice</a:t>
+            </a:r>
+          </a:p>
+        </p:txBody>
+      </p:sp>
+      <p:pic>
+        <p:nvPicPr>
+          <p:cNvPr id="6" name="Picture 5"/>
+          <p:cNvPicPr>
+            <a:picLocks noChangeAspect="1"/>
+          </p:cNvPicPr>
+          <p:nvPr/>
+        </p:nvPicPr>
+        <p:blipFill>
+          <a:blip r:embed="rId5">
+            <a:extLst>
+              <a:ext uri="{28A0092B-C50C-407E-A947-70E740481C1C}">
+                <a14:useLocalDpi xmlns:a14="http://schemas.microsoft.com/office/drawing/2010/main" val="0"/>
+              </a:ext>
+            </a:extLst>
+          </a:blip>
+          <a:stretch>
+            <a:fillRect/>
+          </a:stretch>
+        </p:blipFill>
+        <p:spPr>
+          <a:xfrm>
+            <a:off x="83274" y="3686175"/>
+            <a:ext cx="2743583" cy="2743583"/>
+          </a:xfrm>
+          <a:prstGeom prst="rect">
+            <a:avLst/>
+          </a:prstGeom>
+        </p:spPr>
+      </p:pic>
+      <p:sp>
+        <p:nvSpPr>
+          <p:cNvPr id="4" name="Oval 3"/>
+          <p:cNvSpPr/>
+          <p:nvPr/>
+        </p:nvSpPr>
+        <p:spPr>
+          <a:xfrm>
+            <a:off x="10210800" y="1334395"/>
+            <a:ext cx="1552575" cy="1075429"/>
+          </a:xfrm>
+          <a:prstGeom prst="ellipse">
+            <a:avLst/>
+          </a:prstGeom>
+          <a:noFill/>
+          <a:ln w="28575">
+            <a:solidFill>
+              <a:srgbClr val="00B050"/>
+            </a:solidFill>
+          </a:ln>
+        </p:spPr>
+        <p:style>
+          <a:lnRef idx="2">
+            <a:schemeClr val="accent1">
+              <a:shade val="50000"/>
+            </a:schemeClr>
+          </a:lnRef>
+          <a:fillRef idx="1">
+            <a:schemeClr val="accent1"/>
+          </a:fillRef>
+          <a:effectRef idx="0">
+            <a:schemeClr val="accent1"/>
+          </a:effectRef>
+          <a:fontRef idx="minor">
+            <a:schemeClr val="lt1"/>
+          </a:fontRef>
+        </p:style>
+        <p:txBody>
+          <a:bodyPr rtlCol="0" anchor="ctr"/>
+          <a:lstStyle/>
+          <a:p>
+            <a:pPr algn="ctr"/>
+            <a:endParaRPr lang="en-US"/>
+          </a:p>
+        </p:txBody>
+      </p:sp>
+      <p:sp>
+        <p:nvSpPr>
+          <p:cNvPr id="7" name="Oval 6"/>
+          <p:cNvSpPr/>
+          <p:nvPr/>
+        </p:nvSpPr>
+        <p:spPr>
+          <a:xfrm>
+            <a:off x="4277360" y="1334394"/>
+            <a:ext cx="873760" cy="5095363"/>
+          </a:xfrm>
+          <a:prstGeom prst="ellipse">
+            <a:avLst/>
+          </a:prstGeom>
+          <a:noFill/>
+          <a:ln w="28575">
+            <a:solidFill>
+              <a:srgbClr val="00B050"/>
+            </a:solidFill>
+          </a:ln>
+        </p:spPr>
+        <p:style>
+          <a:lnRef idx="2">
+            <a:schemeClr val="accent1">
+              <a:shade val="50000"/>
+            </a:schemeClr>
+          </a:lnRef>
+          <a:fillRef idx="1">
+            <a:schemeClr val="accent1"/>
+          </a:fillRef>
+          <a:effectRef idx="0">
+            <a:schemeClr val="accent1"/>
+          </a:effectRef>
+          <a:fontRef idx="minor">
+            <a:schemeClr val="lt1"/>
+          </a:fontRef>
+        </p:style>
+        <p:txBody>
+          <a:bodyPr rtlCol="0" anchor="ctr"/>
+          <a:lstStyle/>
+          <a:p>
+            <a:pPr algn="ctr"/>
+            <a:endParaRPr lang="en-US"/>
+          </a:p>
+        </p:txBody>
+      </p:sp>
+      <p:sp>
+        <p:nvSpPr>
+          <p:cNvPr id="9" name="TextBox 8"/>
+          <p:cNvSpPr txBox="1"/>
+          <p:nvPr/>
+        </p:nvSpPr>
+        <p:spPr>
+          <a:xfrm>
+            <a:off x="1272857" y="5905668"/>
+            <a:ext cx="802168" cy="369332"/>
+          </a:xfrm>
+          <a:prstGeom prst="rect">
+            <a:avLst/>
+          </a:prstGeom>
+          <a:noFill/>
+        </p:spPr>
+        <p:txBody>
+          <a:bodyPr wrap="square" rtlCol="0">
+            <a:spAutoFit/>
+          </a:bodyPr>
+          <a:lstStyle/>
+          <a:p>
+            <a:r>
+              <a:rPr lang="en-US" dirty="0" smtClean="0">
+                <a:solidFill>
+                  <a:srgbClr val="00B050"/>
+                </a:solidFill>
+              </a:rPr>
+              <a:t>$</a:t>
+            </a:r>
+            <a:endParaRPr lang="en-US" dirty="0">
+              <a:solidFill>
+                <a:srgbClr val="00B050"/>
+              </a:solidFill>
+            </a:endParaRPr>
+          </a:p>
+        </p:txBody>
+      </p:sp>
+      <p:sp>
+        <p:nvSpPr>
+          <p:cNvPr id="10" name="TextBox 9"/>
+          <p:cNvSpPr txBox="1"/>
+          <p:nvPr/>
+        </p:nvSpPr>
+        <p:spPr>
+          <a:xfrm>
+            <a:off x="6723833" y="4696628"/>
+            <a:ext cx="802168" cy="276999"/>
+          </a:xfrm>
+          <a:prstGeom prst="rect">
+            <a:avLst/>
+          </a:prstGeom>
+          <a:noFill/>
+        </p:spPr>
+        <p:txBody>
+          <a:bodyPr wrap="square" rtlCol="0">
+            <a:spAutoFit/>
+          </a:bodyPr>
+          <a:lstStyle/>
+          <a:p>
+            <a:r>
+              <a:rPr lang="en-US" sz="1200" dirty="0" smtClean="0">
+                <a:solidFill>
+                  <a:srgbClr val="00B050"/>
+                </a:solidFill>
+              </a:rPr>
+              <a:t>$</a:t>
+            </a:r>
+            <a:endParaRPr lang="en-US" sz="1200" dirty="0">
+              <a:solidFill>
+                <a:srgbClr val="00B050"/>
+              </a:solidFill>
+            </a:endParaRPr>
+          </a:p>
+        </p:txBody>
+      </p:sp>
+      <p:sp>
+        <p:nvSpPr>
+          <p:cNvPr id="11" name="TextBox 10"/>
+          <p:cNvSpPr txBox="1"/>
+          <p:nvPr/>
+        </p:nvSpPr>
+        <p:spPr>
+          <a:xfrm>
+            <a:off x="7660166" y="4005748"/>
+            <a:ext cx="802168" cy="369332"/>
+          </a:xfrm>
+          <a:prstGeom prst="rect">
+            <a:avLst/>
+          </a:prstGeom>
+          <a:noFill/>
+        </p:spPr>
+        <p:txBody>
+          <a:bodyPr wrap="square" rtlCol="0">
+            <a:spAutoFit/>
+          </a:bodyPr>
+          <a:lstStyle/>
+          <a:p>
+            <a:r>
+              <a:rPr lang="en-US" dirty="0" smtClean="0">
+                <a:solidFill>
+                  <a:srgbClr val="00B050"/>
+                </a:solidFill>
+              </a:rPr>
+              <a:t>$</a:t>
+            </a:r>
+            <a:endParaRPr lang="en-US" dirty="0">
+              <a:solidFill>
+                <a:srgbClr val="00B050"/>
+              </a:solidFill>
+            </a:endParaRPr>
+          </a:p>
+        </p:txBody>
+      </p:sp>
+      <p:sp>
+        <p:nvSpPr>
+          <p:cNvPr id="12" name="TextBox 11"/>
+          <p:cNvSpPr txBox="1"/>
+          <p:nvPr/>
+        </p:nvSpPr>
+        <p:spPr>
+          <a:xfrm>
+            <a:off x="8943657" y="3040548"/>
+            <a:ext cx="802168" cy="369332"/>
+          </a:xfrm>
+          <a:prstGeom prst="rect">
+            <a:avLst/>
+          </a:prstGeom>
+          <a:noFill/>
+        </p:spPr>
+        <p:txBody>
+          <a:bodyPr wrap="square" rtlCol="0">
+            <a:spAutoFit/>
+          </a:bodyPr>
+          <a:lstStyle/>
+          <a:p>
+            <a:r>
+              <a:rPr lang="en-US" b="1" dirty="0" smtClean="0">
+                <a:solidFill>
+                  <a:srgbClr val="00B050"/>
+                </a:solidFill>
+              </a:rPr>
+              <a:t>$$$</a:t>
+            </a:r>
+            <a:endParaRPr lang="en-US" b="1" dirty="0">
+              <a:solidFill>
+                <a:srgbClr val="00B050"/>
+              </a:solidFill>
+            </a:endParaRPr>
+          </a:p>
+        </p:txBody>
+      </p:sp>
+      <p:sp>
+        <p:nvSpPr>
+          <p:cNvPr id="13" name="TextBox 12"/>
+          <p:cNvSpPr txBox="1"/>
+          <p:nvPr/>
+        </p:nvSpPr>
+        <p:spPr>
+          <a:xfrm>
+            <a:off x="10447337" y="2029227"/>
+            <a:ext cx="802168" cy="369332"/>
+          </a:xfrm>
+          <a:prstGeom prst="rect">
+            <a:avLst/>
+          </a:prstGeom>
+          <a:noFill/>
+        </p:spPr>
+        <p:txBody>
+          <a:bodyPr wrap="square" rtlCol="0">
+            <a:spAutoFit/>
+          </a:bodyPr>
+          <a:lstStyle/>
+          <a:p>
+            <a:r>
+              <a:rPr lang="en-US" b="1" dirty="0" smtClean="0">
+                <a:solidFill>
+                  <a:srgbClr val="00B050"/>
+                </a:solidFill>
+              </a:rPr>
+              <a:t>$$$$</a:t>
+            </a:r>
+            <a:endParaRPr lang="en-US" b="1" dirty="0">
+              <a:solidFill>
+                <a:srgbClr val="00B050"/>
+              </a:solidFill>
+            </a:endParaRPr>
+          </a:p>
+        </p:txBody>
+      </p:sp>
+    </p:spTree>
+    <p:extLst>
+      <p:ext uri="{BB962C8B-B14F-4D97-AF65-F5344CB8AC3E}">
+        <p14:creationId xmlns:p14="http://schemas.microsoft.com/office/powerpoint/2010/main" val="4009897594"/>
+      </p:ext>
+    </p:extLst>
+  </p:cSld>
+  <p:clrMapOvr>
+    <a:masterClrMapping/>
+  </p:clrMapOvr>
+  <p:timing>
+    <p:tnLst>
+      <p:par>
+        <p:cTn id="1" dur="indefinite" restart="never" nodeType="tmRoot"/>
+      </p:par>
+    </p:tnLst>
+  </p:timing>
+</p:sld>
+</file>
+
+<file path=ppt/slides/slide14.xml><?xml version="1.0" encoding="utf-8"?>
+<p:sld xmlns:a="http://schemas.openxmlformats.org/drawingml/2006/main" xmlns:r="http://schemas.openxmlformats.org/officeDocument/2006/relationships" xmlns:p="http://schemas.openxmlformats.org/presentationml/2006/main">
+  <p:cSld>
+    <p:spTree>
+      <p:nvGrpSpPr>
+        <p:cNvPr id="1" name=""/>
+        <p:cNvGrpSpPr/>
+        <p:nvPr/>
+      </p:nvGrpSpPr>
+      <p:grpSpPr>
+        <a:xfrm>
+          <a:off x="0" y="0"/>
+          <a:ext cx="0" cy="0"/>
+          <a:chOff x="0" y="0"/>
+          <a:chExt cx="0" cy="0"/>
+        </a:xfrm>
+      </p:grpSpPr>
+      <p:sp>
+        <p:nvSpPr>
+          <p:cNvPr id="2" name="Title 1"/>
+          <p:cNvSpPr>
+            <a:spLocks noGrp="1"/>
+          </p:cNvSpPr>
+          <p:nvPr>
+            <p:ph type="title"/>
+          </p:nvPr>
+        </p:nvSpPr>
+        <p:spPr/>
+        <p:txBody>
+          <a:bodyPr>
+            <a:normAutofit fontScale="90000"/>
+          </a:bodyPr>
+          <a:lstStyle/>
+          <a:p>
+            <a:pPr lvl="0"/>
+            <a:r>
+              <a:rPr lang="en-US" dirty="0" smtClean="0"/>
+              <a:t>BAH Field Guide: </a:t>
+            </a:r>
+            <a:br>
+              <a:rPr lang="en-US" dirty="0" smtClean="0"/>
+            </a:br>
+            <a:r>
+              <a:rPr lang="en-US" b="1" dirty="0" smtClean="0"/>
+              <a:t>Data Science is the art of turning data into actions:</a:t>
+            </a:r>
+            <a:endParaRPr lang="en-US" b="1" dirty="0"/>
+          </a:p>
+        </p:txBody>
+      </p:sp>
+      <p:sp>
+        <p:nvSpPr>
+          <p:cNvPr id="3" name="Content Placeholder 2"/>
+          <p:cNvSpPr>
+            <a:spLocks noGrp="1"/>
+          </p:cNvSpPr>
+          <p:nvPr>
+            <p:ph idx="1"/>
+          </p:nvPr>
+        </p:nvSpPr>
+        <p:spPr>
+          <a:xfrm>
+            <a:off x="838200" y="1825625"/>
+            <a:ext cx="10515600" cy="4832350"/>
+          </a:xfrm>
+        </p:spPr>
+        <p:txBody>
+          <a:bodyPr>
+            <a:normAutofit/>
+          </a:bodyPr>
+          <a:lstStyle/>
+          <a:p>
+            <a:pPr lvl="0"/>
+            <a:r>
+              <a:rPr lang="en-US" sz="3200" dirty="0" smtClean="0"/>
+              <a:t>Tradecraft </a:t>
+            </a:r>
+            <a:r>
+              <a:rPr lang="en-US" sz="3200" i="1" dirty="0" smtClean="0"/>
+              <a:t>creates </a:t>
+            </a:r>
+            <a:r>
+              <a:rPr lang="en-US" sz="3200" b="1" i="1" dirty="0" smtClean="0"/>
+              <a:t>data products</a:t>
+            </a:r>
+            <a:endParaRPr lang="en-US" sz="3200" b="1" dirty="0" smtClean="0"/>
+          </a:p>
+          <a:p>
+            <a:pPr lvl="1"/>
+            <a:r>
+              <a:rPr lang="en-US" sz="3200" dirty="0" smtClean="0"/>
+              <a:t>Drive </a:t>
+            </a:r>
+            <a:r>
+              <a:rPr lang="en-US" sz="3200" dirty="0"/>
+              <a:t>actions </a:t>
+            </a:r>
+            <a:r>
+              <a:rPr lang="en-US" sz="3200" dirty="0" smtClean="0"/>
+              <a:t>– </a:t>
+            </a:r>
+            <a:r>
+              <a:rPr lang="en-US" sz="3200" b="1" i="1" dirty="0" smtClean="0"/>
+              <a:t>advice</a:t>
+            </a:r>
+            <a:r>
+              <a:rPr lang="en-US" sz="3200" dirty="0" smtClean="0"/>
+              <a:t> – possibility and danger</a:t>
+            </a:r>
+          </a:p>
+          <a:p>
+            <a:pPr lvl="0"/>
+            <a:r>
+              <a:rPr lang="en-US" sz="3200" dirty="0" smtClean="0"/>
+              <a:t>Supports and encourages shifting between:</a:t>
+            </a:r>
+          </a:p>
+          <a:p>
+            <a:pPr lvl="1"/>
+            <a:r>
+              <a:rPr lang="en-US" sz="3200" b="1" dirty="0" smtClean="0"/>
+              <a:t>Deductive</a:t>
+            </a:r>
+            <a:r>
+              <a:rPr lang="en-US" sz="3200" dirty="0" smtClean="0"/>
+              <a:t> (hypothesis-based) reasoning</a:t>
+            </a:r>
+          </a:p>
+          <a:p>
+            <a:pPr lvl="1"/>
+            <a:r>
+              <a:rPr lang="en-US" sz="3200" b="1" dirty="0" smtClean="0"/>
+              <a:t>Inductive</a:t>
+            </a:r>
+            <a:r>
+              <a:rPr lang="en-US" sz="3200" dirty="0" smtClean="0"/>
+              <a:t> (pattern-based) reasoning</a:t>
+            </a:r>
+          </a:p>
+          <a:p>
+            <a:pPr lvl="0"/>
+            <a:r>
+              <a:rPr lang="en-US" sz="3200" dirty="0"/>
+              <a:t>N</a:t>
+            </a:r>
+            <a:r>
+              <a:rPr lang="en-US" sz="3200" dirty="0" smtClean="0"/>
+              <a:t>ecessary for companies to </a:t>
+            </a:r>
+            <a:r>
+              <a:rPr lang="en-US" sz="3200" b="1" dirty="0" smtClean="0"/>
+              <a:t>compete</a:t>
+            </a:r>
+          </a:p>
+          <a:p>
+            <a:pPr lvl="0"/>
+            <a:r>
+              <a:rPr lang="en-US" sz="3200" dirty="0" smtClean="0"/>
+              <a:t>Capabilities </a:t>
+            </a:r>
+            <a:r>
+              <a:rPr lang="en-US" sz="3200" b="1" dirty="0" smtClean="0"/>
+              <a:t>can be built</a:t>
+            </a:r>
+            <a:r>
+              <a:rPr lang="en-US" sz="3200" dirty="0" smtClean="0"/>
+              <a:t> over time</a:t>
+            </a:r>
+          </a:p>
+          <a:p>
+            <a:pPr lvl="0"/>
+            <a:r>
+              <a:rPr lang="en-US" sz="3200" dirty="0" smtClean="0"/>
+              <a:t>Different kind of team sport</a:t>
+            </a:r>
+          </a:p>
+          <a:p>
+            <a:pPr lvl="1"/>
+            <a:r>
+              <a:rPr lang="en-US" sz="2800" dirty="0" smtClean="0"/>
+              <a:t>Company-wide </a:t>
+            </a:r>
+            <a:r>
+              <a:rPr lang="en-US" sz="2800" i="1" dirty="0" smtClean="0"/>
+              <a:t>open culture </a:t>
+            </a:r>
+            <a:r>
+              <a:rPr lang="en-US" sz="2800" dirty="0" smtClean="0"/>
+              <a:t>– commitment to insights from data</a:t>
+            </a:r>
+            <a:endParaRPr lang="en-US" sz="2800" dirty="0"/>
+          </a:p>
+        </p:txBody>
+      </p:sp>
+    </p:spTree>
+    <p:extLst>
+      <p:ext uri="{BB962C8B-B14F-4D97-AF65-F5344CB8AC3E}">
+        <p14:creationId xmlns:p14="http://schemas.microsoft.com/office/powerpoint/2010/main" val="1356862054"/>
+      </p:ext>
+    </p:extLst>
+  </p:cSld>
+  <p:clrMapOvr>
+    <a:masterClrMapping/>
+  </p:clrMapOvr>
+  <p:timing>
+    <p:tnLst>
+      <p:par>
+        <p:cTn id="1" dur="indefinite" restart="never" nodeType="tmRoot"/>
+      </p:par>
+    </p:tnLst>
+  </p:timing>
+</p:sld>
+</file>
+
+<file path=ppt/slides/slide15.xml><?xml version="1.0" encoding="utf-8"?>
+<p:sld xmlns:a="http://schemas.openxmlformats.org/drawingml/2006/main" xmlns:r="http://schemas.openxmlformats.org/officeDocument/2006/relationships" xmlns:p="http://schemas.openxmlformats.org/presentationml/2006/main">
+  <p:cSld>
+    <p:spTree>
+      <p:nvGrpSpPr>
+        <p:cNvPr id="1" name=""/>
+        <p:cNvGrpSpPr/>
+        <p:nvPr/>
+      </p:nvGrpSpPr>
+      <p:grpSpPr>
+        <a:xfrm>
+          <a:off x="0" y="0"/>
+          <a:ext cx="0" cy="0"/>
+          <a:chOff x="0" y="0"/>
+          <a:chExt cx="0" cy="0"/>
+        </a:xfrm>
+      </p:grpSpPr>
+      <p:sp>
+        <p:nvSpPr>
+          <p:cNvPr id="2" name="Title 1"/>
+          <p:cNvSpPr>
+            <a:spLocks noGrp="1"/>
+          </p:cNvSpPr>
+          <p:nvPr>
+            <p:ph type="title"/>
+          </p:nvPr>
+        </p:nvSpPr>
+        <p:spPr>
+          <a:xfrm>
             <a:off x="0" y="1"/>
             <a:ext cx="12192000" cy="1007390"/>
           </a:xfrm>
@@ -9360,26 +10502,14 @@
           <a:p>
             <a:r>
               <a:rPr lang="en-US" baseline="0" dirty="0" smtClean="0"/>
-              <a:t>Earned </a:t>
-            </a:r>
-            <a:r>
-              <a:rPr lang="en-US" baseline="0" dirty="0" smtClean="0"/>
-              <a:t>Value </a:t>
-            </a:r>
-            <a:r>
-              <a:rPr lang="en-US" baseline="0" dirty="0" smtClean="0"/>
-              <a:t>Management =</a:t>
+              <a:t>Earned Value Management =</a:t>
             </a:r>
             <a:br>
               <a:rPr lang="en-US" baseline="0" dirty="0" smtClean="0"/>
             </a:br>
             <a:r>
               <a:rPr lang="en-US" baseline="0" dirty="0" smtClean="0"/>
-              <a:t>value </a:t>
-            </a:r>
-            <a:r>
-              <a:rPr lang="en-US" baseline="0" dirty="0" smtClean="0"/>
-              <a:t>earned from work being done </a:t>
+              <a:t>value earned from work being done </a:t>
             </a:r>
             <a:r>
               <a:rPr lang="en-US" baseline="0" dirty="0" smtClean="0">
@@ -9399,19 +10529,7 @@
           <a:p>
             <a:r>
               <a:rPr lang="en-US" dirty="0" smtClean="0"/>
-              <a:t>Plan your </a:t>
-            </a:r>
-            <a:r>
-              <a:rPr lang="en-US" dirty="0" smtClean="0"/>
-              <a:t>work </a:t>
-            </a:r>
-            <a:r>
-              <a:rPr lang="en-US" dirty="0" smtClean="0"/>
-              <a:t>work your </a:t>
-            </a:r>
-            <a:r>
-              <a:rPr lang="en-US" dirty="0" smtClean="0"/>
-              <a:t>plan</a:t>
+              <a:t>Plan your work work your plan</a:t>
             </a:r>
             <a:br>
               <a:rPr lang="en-US" dirty="0" smtClean="0"/>
@@ -9548,7 +10666,7 @@
                   <a:srgbClr val="0070C0"/>
                 </a:solidFill>
               </a:rPr>
-              <a:t>Effort</a:t>
+              <a:t>Maturity</a:t>
             </a:r>
             <a:endParaRPr lang="en-US" sz="2800" b="1" dirty="0">
               <a:solidFill>
@@ -9586,7 +10704,7 @@
                   <a:srgbClr val="0070C0"/>
                 </a:solidFill>
               </a:rPr>
-              <a:t>Maturity</a:t>
+              <a:t>Effort</a:t>
             </a:r>
             <a:endParaRPr lang="en-US" sz="2800" b="1" dirty="0">
               <a:solidFill>
@@ -9646,7 +10764,7 @@
 </p:sld>
 </file>
 
-<file path=ppt/slides/slide14.xml><?xml version="1.0" encoding="utf-8"?>
+<file path=ppt/slides/slide16.xml><?xml version="1.0" encoding="utf-8"?>
 <p:sld xmlns:a="http://schemas.openxmlformats.org/drawingml/2006/main" xmlns:r="http://schemas.openxmlformats.org/officeDocument/2006/relationships" xmlns:p="http://schemas.openxmlformats.org/presentationml/2006/main">
   <p:cSld>
     <p:spTree>
@@ -9747,7 +10865,7 @@
 </p:sld>
 </file>
 
-<file path=ppt/slides/slide15.xml><?xml version="1.0" encoding="utf-8"?>
+<file path=ppt/slides/slide17.xml><?xml version="1.0" encoding="utf-8"?>
 <p:sld xmlns:a="http://schemas.openxmlformats.org/drawingml/2006/main" xmlns:r="http://schemas.openxmlformats.org/officeDocument/2006/relationships" xmlns:p="http://schemas.openxmlformats.org/presentationml/2006/main">
   <p:cSld>
     <p:spTree>
@@ -9891,7 +11009,7 @@
 </p:sld>
 </file>
 
-<file path=ppt/slides/slide16.xml><?xml version="1.0" encoding="utf-8"?>
+<file path=ppt/slides/slide18.xml><?xml version="1.0" encoding="utf-8"?>
 <p:sld xmlns:a="http://schemas.openxmlformats.org/drawingml/2006/main" xmlns:r="http://schemas.openxmlformats.org/officeDocument/2006/relationships" xmlns:p="http://schemas.openxmlformats.org/presentationml/2006/main">
   <p:cSld>
     <p:spTree>
@@ -10010,11 +11128,7 @@
           <a:p>
             <a:r>
               <a:rPr lang="en-US" dirty="0" smtClean="0"/>
-              <a:t>Possibility - clockwise </a:t>
-            </a:r>
-            <a:r>
-              <a:rPr lang="en-US" dirty="0" smtClean="0"/>
-              <a:t>(Opportunity):</a:t>
+              <a:t>Possibility - clockwise (Opportunity):</a:t>
             </a:r>
             <a:endParaRPr lang="en-US" dirty="0"/>
           </a:p>
@@ -10067,7 +11181,6 @@
               <a:rPr lang="en-US" dirty="0" smtClean="0"/>
               <a:t>Data is only a starting point</a:t>
             </a:r>
-            <a:endParaRPr lang="en-US" dirty="0" smtClean="0"/>
           </a:p>
           <a:p>
             <a:pPr lvl="1"/>
@@ -10096,7 +11209,6 @@
               <a:rPr lang="en-US" dirty="0" smtClean="0"/>
               <a:t>Danger - counterclockwise (Constraint):</a:t>
             </a:r>
-            <a:endParaRPr lang="en-US" dirty="0" smtClean="0"/>
           </a:p>
           <a:p>
             <a:pPr lvl="1"/>
@@ -10110,13 +11222,8 @@
             </a:r>
             <a:r>
               <a:rPr lang="en-US" dirty="0" smtClean="0"/>
-              <a:t> </a:t>
-            </a:r>
-            <a:r>
-              <a:rPr lang="en-US" dirty="0" smtClean="0"/>
-              <a:t>constrains being</a:t>
-            </a:r>
-            <a:endParaRPr lang="en-US" dirty="0" smtClean="0"/>
+              <a:t> constrains being</a:t>
+            </a:r>
           </a:p>
           <a:p>
             <a:pPr lvl="1"/>
@@ -10141,15 +11248,7 @@
             <a:pPr lvl="1"/>
             <a:r>
               <a:rPr lang="en-US" dirty="0" smtClean="0"/>
-              <a:t>Have </a:t>
-            </a:r>
-            <a:r>
-              <a:rPr lang="en-US" dirty="0" smtClean="0"/>
-              <a:t>-&gt; Do -&gt; </a:t>
-            </a:r>
-            <a:r>
-              <a:rPr lang="en-US" dirty="0" smtClean="0"/>
-              <a:t>Be</a:t>
+              <a:t>Have -&gt; Do -&gt; Be</a:t>
             </a:r>
           </a:p>
           <a:p>
@@ -10290,7 +11389,7 @@
 </p:sld>
 </file>
 
-<file path=ppt/slides/slide17.xml><?xml version="1.0" encoding="utf-8"?>
+<file path=ppt/slides/slide19.xml><?xml version="1.0" encoding="utf-8"?>
 <p:sld xmlns:a="http://schemas.openxmlformats.org/drawingml/2006/main" xmlns:r="http://schemas.openxmlformats.org/officeDocument/2006/relationships" xmlns:p="http://schemas.openxmlformats.org/presentationml/2006/main">
   <p:cSld>
     <p:spTree>

</xml_diff>